<commit_message>
delete 5-th bypassing way, make pipeline more classic
</commit_message>
<xml_diff>
--- a/DOC/bypassing.pptx
+++ b/DOC/bypassing.pptx
@@ -109,6 +109,11 @@
       </a:defRPr>
     </a:lvl9pPr>
   </p:defaultTextStyle>
+  <p:extLst>
+    <p:ext uri="{EFAFB233-063F-42B5-8137-9DF3F51BA10A}">
+      <p15:sldGuideLst xmlns:p15="http://schemas.microsoft.com/office/powerpoint/2012/main"/>
+    </p:ext>
+  </p:extLst>
 </p:presentation>
 </file>
 
@@ -243,7 +248,7 @@
           <a:p>
             <a:fld id="{9AFC7ACB-D512-4836-921C-1587C5A585E0}" type="datetimeFigureOut">
               <a:rPr lang="ru-RU" smtClean="0"/>
-              <a:t>01.07.2014</a:t>
+              <a:t>16.07.2014</a:t>
             </a:fld>
             <a:endParaRPr lang="ru-RU"/>
           </a:p>
@@ -413,7 +418,7 @@
           <a:p>
             <a:fld id="{9AFC7ACB-D512-4836-921C-1587C5A585E0}" type="datetimeFigureOut">
               <a:rPr lang="ru-RU" smtClean="0"/>
-              <a:t>01.07.2014</a:t>
+              <a:t>16.07.2014</a:t>
             </a:fld>
             <a:endParaRPr lang="ru-RU"/>
           </a:p>
@@ -593,7 +598,7 @@
           <a:p>
             <a:fld id="{9AFC7ACB-D512-4836-921C-1587C5A585E0}" type="datetimeFigureOut">
               <a:rPr lang="ru-RU" smtClean="0"/>
-              <a:t>01.07.2014</a:t>
+              <a:t>16.07.2014</a:t>
             </a:fld>
             <a:endParaRPr lang="ru-RU"/>
           </a:p>
@@ -763,7 +768,7 @@
           <a:p>
             <a:fld id="{9AFC7ACB-D512-4836-921C-1587C5A585E0}" type="datetimeFigureOut">
               <a:rPr lang="ru-RU" smtClean="0"/>
-              <a:t>01.07.2014</a:t>
+              <a:t>16.07.2014</a:t>
             </a:fld>
             <a:endParaRPr lang="ru-RU"/>
           </a:p>
@@ -1009,7 +1014,7 @@
           <a:p>
             <a:fld id="{9AFC7ACB-D512-4836-921C-1587C5A585E0}" type="datetimeFigureOut">
               <a:rPr lang="ru-RU" smtClean="0"/>
-              <a:t>01.07.2014</a:t>
+              <a:t>16.07.2014</a:t>
             </a:fld>
             <a:endParaRPr lang="ru-RU"/>
           </a:p>
@@ -1241,7 +1246,7 @@
           <a:p>
             <a:fld id="{9AFC7ACB-D512-4836-921C-1587C5A585E0}" type="datetimeFigureOut">
               <a:rPr lang="ru-RU" smtClean="0"/>
-              <a:t>01.07.2014</a:t>
+              <a:t>16.07.2014</a:t>
             </a:fld>
             <a:endParaRPr lang="ru-RU"/>
           </a:p>
@@ -1608,7 +1613,7 @@
           <a:p>
             <a:fld id="{9AFC7ACB-D512-4836-921C-1587C5A585E0}" type="datetimeFigureOut">
               <a:rPr lang="ru-RU" smtClean="0"/>
-              <a:t>01.07.2014</a:t>
+              <a:t>16.07.2014</a:t>
             </a:fld>
             <a:endParaRPr lang="ru-RU"/>
           </a:p>
@@ -1726,7 +1731,7 @@
           <a:p>
             <a:fld id="{9AFC7ACB-D512-4836-921C-1587C5A585E0}" type="datetimeFigureOut">
               <a:rPr lang="ru-RU" smtClean="0"/>
-              <a:t>01.07.2014</a:t>
+              <a:t>16.07.2014</a:t>
             </a:fld>
             <a:endParaRPr lang="ru-RU"/>
           </a:p>
@@ -1821,7 +1826,7 @@
           <a:p>
             <a:fld id="{9AFC7ACB-D512-4836-921C-1587C5A585E0}" type="datetimeFigureOut">
               <a:rPr lang="ru-RU" smtClean="0"/>
-              <a:t>01.07.2014</a:t>
+              <a:t>16.07.2014</a:t>
             </a:fld>
             <a:endParaRPr lang="ru-RU"/>
           </a:p>
@@ -2098,7 +2103,7 @@
           <a:p>
             <a:fld id="{9AFC7ACB-D512-4836-921C-1587C5A585E0}" type="datetimeFigureOut">
               <a:rPr lang="ru-RU" smtClean="0"/>
-              <a:t>01.07.2014</a:t>
+              <a:t>16.07.2014</a:t>
             </a:fld>
             <a:endParaRPr lang="ru-RU"/>
           </a:p>
@@ -2351,7 +2356,7 @@
           <a:p>
             <a:fld id="{9AFC7ACB-D512-4836-921C-1587C5A585E0}" type="datetimeFigureOut">
               <a:rPr lang="ru-RU" smtClean="0"/>
-              <a:t>01.07.2014</a:t>
+              <a:t>16.07.2014</a:t>
             </a:fld>
             <a:endParaRPr lang="ru-RU"/>
           </a:p>
@@ -2564,7 +2569,7 @@
           <a:p>
             <a:fld id="{9AFC7ACB-D512-4836-921C-1587C5A585E0}" type="datetimeFigureOut">
               <a:rPr lang="ru-RU" smtClean="0"/>
-              <a:t>01.07.2014</a:t>
+              <a:t>16.07.2014</a:t>
             </a:fld>
             <a:endParaRPr lang="ru-RU"/>
           </a:p>
@@ -3009,7 +3014,17 @@
           <a:p>
             <a:r>
               <a:rPr lang="en-US" dirty="0" smtClean="0"/>
-              <a:t>There are totally 5 bypass ways</a:t>
+              <a:t>There are totally 5 bypass </a:t>
+            </a:r>
+            <a:r>
+              <a:rPr lang="en-US" dirty="0" smtClean="0"/>
+              <a:t>ways</a:t>
+            </a:r>
+          </a:p>
+          <a:p>
+            <a:r>
+              <a:rPr lang="en-US" dirty="0" smtClean="0"/>
+              <a:t>(but only 4 are used)</a:t>
             </a:r>
             <a:endParaRPr lang="ru-RU" dirty="0"/>
           </a:p>
@@ -4085,19 +4100,8 @@
                 <a:latin typeface="Courier New" panose="02070309020205020404" pitchFamily="49" charset="0"/>
                 <a:cs typeface="Courier New" panose="02070309020205020404" pitchFamily="49" charset="0"/>
               </a:rPr>
-              <a:t>            </a:t>
-            </a:r>
-            <a:r>
-              <a:rPr lang="en-US" sz="2400" b="1" dirty="0" smtClean="0">
-                <a:latin typeface="Courier New" panose="02070309020205020404" pitchFamily="49" charset="0"/>
-                <a:cs typeface="Courier New" panose="02070309020205020404" pitchFamily="49" charset="0"/>
-              </a:rPr>
-              <a:t>|     F D X M W</a:t>
-            </a:r>
-            <a:endParaRPr lang="en-US" sz="2400" b="1" dirty="0" smtClean="0">
-              <a:latin typeface="Courier New" panose="02070309020205020404" pitchFamily="49" charset="0"/>
-              <a:cs typeface="Courier New" panose="02070309020205020404" pitchFamily="49" charset="0"/>
-            </a:endParaRPr>
+              <a:t>            |     F D X M W</a:t>
+            </a:r>
           </a:p>
           <a:p>
             <a:pPr marL="0" indent="0">
@@ -6744,9 +6748,13 @@
           <a:p>
             <a:r>
               <a:rPr lang="en-US" dirty="0" smtClean="0"/>
-              <a:t>5) After M to M</a:t>
-            </a:r>
-            <a:endParaRPr lang="ru-RU" dirty="0"/>
+              <a:t>5) </a:t>
+            </a:r>
+            <a:r>
+              <a:rPr lang="en-US" strike="sngStrike" dirty="0" smtClean="0"/>
+              <a:t>After M to M</a:t>
+            </a:r>
+            <a:endParaRPr lang="ru-RU" strike="sngStrike" dirty="0"/>
           </a:p>
         </p:txBody>
       </p:sp>
@@ -6760,7 +6768,12 @@
             <p:ph idx="1"/>
           </p:nvPr>
         </p:nvSpPr>
-        <p:spPr/>
+        <p:spPr>
+          <a:xfrm>
+            <a:off x="838200" y="1825624"/>
+            <a:ext cx="10515600" cy="4911237"/>
+          </a:xfrm>
+        </p:spPr>
         <p:txBody>
           <a:bodyPr/>
           <a:lstStyle/>
@@ -6823,7 +6836,39 @@
                 <a:latin typeface="Courier New" panose="02070309020205020404" pitchFamily="49" charset="0"/>
                 <a:cs typeface="Courier New" panose="02070309020205020404" pitchFamily="49" charset="0"/>
               </a:rPr>
-              <a:t>  R4,(R3+255)  |   F D X M W</a:t>
+              <a:t>  R4,(R3+255)  |   F D X M </a:t>
+            </a:r>
+            <a:r>
+              <a:rPr lang="en-US" sz="2400" b="1" dirty="0" smtClean="0">
+                <a:latin typeface="Courier New" panose="02070309020205020404" pitchFamily="49" charset="0"/>
+                <a:cs typeface="Courier New" panose="02070309020205020404" pitchFamily="49" charset="0"/>
+              </a:rPr>
+              <a:t>W</a:t>
+            </a:r>
+            <a:endParaRPr lang="ru-RU" sz="2400" b="1" dirty="0" smtClean="0">
+              <a:latin typeface="Courier New" panose="02070309020205020404" pitchFamily="49" charset="0"/>
+              <a:cs typeface="Courier New" panose="02070309020205020404" pitchFamily="49" charset="0"/>
+            </a:endParaRPr>
+          </a:p>
+          <a:p>
+            <a:pPr marL="0" indent="0">
+              <a:buNone/>
+            </a:pPr>
+            <a:endParaRPr lang="ru-RU" sz="2400" b="1" dirty="0">
+              <a:latin typeface="Courier New" panose="02070309020205020404" pitchFamily="49" charset="0"/>
+              <a:cs typeface="Courier New" panose="02070309020205020404" pitchFamily="49" charset="0"/>
+            </a:endParaRPr>
+          </a:p>
+          <a:p>
+            <a:pPr marL="0" indent="0">
+              <a:buNone/>
+            </a:pPr>
+            <a:r>
+              <a:rPr lang="en-US" sz="2400" b="1" dirty="0" smtClean="0">
+                <a:latin typeface="Courier New" panose="02070309020205020404" pitchFamily="49" charset="0"/>
+                <a:cs typeface="Courier New" panose="02070309020205020404" pitchFamily="49" charset="0"/>
+              </a:rPr>
+              <a:t>Don’t do this, because memory instructions are of 2 cycles latency</a:t>
             </a:r>
             <a:endParaRPr lang="ru-RU" sz="2400" b="1" dirty="0">
               <a:latin typeface="Courier New" panose="02070309020205020404" pitchFamily="49" charset="0"/>

</xml_diff>